<commit_message>
updated with more options on ObsModel
</commit_message>
<xml_diff>
--- a/presentations/2022/01_18_2022/Updated Plots.pptx
+++ b/presentations/2022/01_18_2022/Updated Plots.pptx
@@ -117,6 +117,11 @@
       </a:defRPr>
     </a:lvl9pPr>
   </p:defaultTextStyle>
+  <p:extLst>
+    <p:ext uri="{EFAFB233-063F-42B5-8137-9DF3F51BA10A}">
+      <p15:sldGuideLst xmlns:p15="http://schemas.microsoft.com/office/powerpoint/2012/main"/>
+    </p:ext>
+  </p:extLst>
 </p:presentation>
 </file>
 
@@ -251,7 +256,7 @@
           <a:p>
             <a:fld id="{8DB7D037-FB2F-455E-9BEE-4BAD1EF5C5CC}" type="datetimeFigureOut">
               <a:rPr lang="en-US" smtClean="0"/>
-              <a:t>1/18/2022</a:t>
+              <a:t>2/2/2022</a:t>
             </a:fld>
             <a:endParaRPr lang="en-US"/>
           </a:p>
@@ -421,7 +426,7 @@
           <a:p>
             <a:fld id="{8DB7D037-FB2F-455E-9BEE-4BAD1EF5C5CC}" type="datetimeFigureOut">
               <a:rPr lang="en-US" smtClean="0"/>
-              <a:t>1/18/2022</a:t>
+              <a:t>2/2/2022</a:t>
             </a:fld>
             <a:endParaRPr lang="en-US"/>
           </a:p>
@@ -601,7 +606,7 @@
           <a:p>
             <a:fld id="{8DB7D037-FB2F-455E-9BEE-4BAD1EF5C5CC}" type="datetimeFigureOut">
               <a:rPr lang="en-US" smtClean="0"/>
-              <a:t>1/18/2022</a:t>
+              <a:t>2/2/2022</a:t>
             </a:fld>
             <a:endParaRPr lang="en-US"/>
           </a:p>
@@ -771,7 +776,7 @@
           <a:p>
             <a:fld id="{8DB7D037-FB2F-455E-9BEE-4BAD1EF5C5CC}" type="datetimeFigureOut">
               <a:rPr lang="en-US" smtClean="0"/>
-              <a:t>1/18/2022</a:t>
+              <a:t>2/2/2022</a:t>
             </a:fld>
             <a:endParaRPr lang="en-US"/>
           </a:p>
@@ -1017,7 +1022,7 @@
           <a:p>
             <a:fld id="{8DB7D037-FB2F-455E-9BEE-4BAD1EF5C5CC}" type="datetimeFigureOut">
               <a:rPr lang="en-US" smtClean="0"/>
-              <a:t>1/18/2022</a:t>
+              <a:t>2/2/2022</a:t>
             </a:fld>
             <a:endParaRPr lang="en-US"/>
           </a:p>
@@ -1249,7 +1254,7 @@
           <a:p>
             <a:fld id="{8DB7D037-FB2F-455E-9BEE-4BAD1EF5C5CC}" type="datetimeFigureOut">
               <a:rPr lang="en-US" smtClean="0"/>
-              <a:t>1/18/2022</a:t>
+              <a:t>2/2/2022</a:t>
             </a:fld>
             <a:endParaRPr lang="en-US"/>
           </a:p>
@@ -1616,7 +1621,7 @@
           <a:p>
             <a:fld id="{8DB7D037-FB2F-455E-9BEE-4BAD1EF5C5CC}" type="datetimeFigureOut">
               <a:rPr lang="en-US" smtClean="0"/>
-              <a:t>1/18/2022</a:t>
+              <a:t>2/2/2022</a:t>
             </a:fld>
             <a:endParaRPr lang="en-US"/>
           </a:p>
@@ -1734,7 +1739,7 @@
           <a:p>
             <a:fld id="{8DB7D037-FB2F-455E-9BEE-4BAD1EF5C5CC}" type="datetimeFigureOut">
               <a:rPr lang="en-US" smtClean="0"/>
-              <a:t>1/18/2022</a:t>
+              <a:t>2/2/2022</a:t>
             </a:fld>
             <a:endParaRPr lang="en-US"/>
           </a:p>
@@ -1829,7 +1834,7 @@
           <a:p>
             <a:fld id="{8DB7D037-FB2F-455E-9BEE-4BAD1EF5C5CC}" type="datetimeFigureOut">
               <a:rPr lang="en-US" smtClean="0"/>
-              <a:t>1/18/2022</a:t>
+              <a:t>2/2/2022</a:t>
             </a:fld>
             <a:endParaRPr lang="en-US"/>
           </a:p>
@@ -2106,7 +2111,7 @@
           <a:p>
             <a:fld id="{8DB7D037-FB2F-455E-9BEE-4BAD1EF5C5CC}" type="datetimeFigureOut">
               <a:rPr lang="en-US" smtClean="0"/>
-              <a:t>1/18/2022</a:t>
+              <a:t>2/2/2022</a:t>
             </a:fld>
             <a:endParaRPr lang="en-US"/>
           </a:p>
@@ -2359,7 +2364,7 @@
           <a:p>
             <a:fld id="{8DB7D037-FB2F-455E-9BEE-4BAD1EF5C5CC}" type="datetimeFigureOut">
               <a:rPr lang="en-US" smtClean="0"/>
-              <a:t>1/18/2022</a:t>
+              <a:t>2/2/2022</a:t>
             </a:fld>
             <a:endParaRPr lang="en-US"/>
           </a:p>
@@ -2572,7 +2577,7 @@
           <a:p>
             <a:fld id="{8DB7D037-FB2F-455E-9BEE-4BAD1EF5C5CC}" type="datetimeFigureOut">
               <a:rPr lang="en-US" smtClean="0"/>
-              <a:t>1/18/2022</a:t>
+              <a:t>2/2/2022</a:t>
             </a:fld>
             <a:endParaRPr lang="en-US"/>
           </a:p>
@@ -3911,7 +3916,7 @@
         </p:blipFill>
         <p:spPr>
           <a:xfrm>
-            <a:off x="2676137" y="1809594"/>
+            <a:off x="2345937" y="2757861"/>
             <a:ext cx="6839726" cy="3238811"/>
           </a:xfrm>
           <a:prstGeom prst="rect">

</xml_diff>